<commit_message>
Add figure for 4.3b
</commit_message>
<xml_diff>
--- a/hw3/schema_drawing.pptx
+++ b/hw3/schema_drawing.pptx
@@ -6,6 +6,7 @@
   </p:sldMasterIdLst>
   <p:sldIdLst>
     <p:sldId id="257" r:id="rId2"/>
+    <p:sldId id="258" r:id="rId3"/>
   </p:sldIdLst>
   <p:sldSz cx="12192000" cy="6858000"/>
   <p:notesSz cx="6858000" cy="9144000"/>
@@ -104,6 +105,11 @@
       </a:defRPr>
     </a:lvl9pPr>
   </p:defaultTextStyle>
+  <p:extLst>
+    <p:ext uri="{EFAFB233-063F-42B5-8137-9DF3F51BA10A}">
+      <p15:sldGuideLst xmlns:p15="http://schemas.microsoft.com/office/powerpoint/2012/main"/>
+    </p:ext>
+  </p:extLst>
 </p:presentation>
 </file>
 
@@ -254,7 +260,7 @@
           <a:p>
             <a:fld id="{D94C65FD-A4CC-A342-84F7-7DEF60C10B57}" type="datetimeFigureOut">
               <a:rPr lang="en-US" smtClean="0"/>
-              <a:t>10/7/19</a:t>
+              <a:t>10/9/19</a:t>
             </a:fld>
             <a:endParaRPr lang="en-US"/>
           </a:p>
@@ -452,7 +458,7 @@
           <a:p>
             <a:fld id="{D94C65FD-A4CC-A342-84F7-7DEF60C10B57}" type="datetimeFigureOut">
               <a:rPr lang="en-US" smtClean="0"/>
-              <a:t>10/7/19</a:t>
+              <a:t>10/9/19</a:t>
             </a:fld>
             <a:endParaRPr lang="en-US"/>
           </a:p>
@@ -660,7 +666,7 @@
           <a:p>
             <a:fld id="{D94C65FD-A4CC-A342-84F7-7DEF60C10B57}" type="datetimeFigureOut">
               <a:rPr lang="en-US" smtClean="0"/>
-              <a:t>10/7/19</a:t>
+              <a:t>10/9/19</a:t>
             </a:fld>
             <a:endParaRPr lang="en-US"/>
           </a:p>
@@ -858,7 +864,7 @@
           <a:p>
             <a:fld id="{D94C65FD-A4CC-A342-84F7-7DEF60C10B57}" type="datetimeFigureOut">
               <a:rPr lang="en-US" smtClean="0"/>
-              <a:t>10/7/19</a:t>
+              <a:t>10/9/19</a:t>
             </a:fld>
             <a:endParaRPr lang="en-US"/>
           </a:p>
@@ -1133,7 +1139,7 @@
           <a:p>
             <a:fld id="{D94C65FD-A4CC-A342-84F7-7DEF60C10B57}" type="datetimeFigureOut">
               <a:rPr lang="en-US" smtClean="0"/>
-              <a:t>10/7/19</a:t>
+              <a:t>10/9/19</a:t>
             </a:fld>
             <a:endParaRPr lang="en-US"/>
           </a:p>
@@ -1398,7 +1404,7 @@
           <a:p>
             <a:fld id="{D94C65FD-A4CC-A342-84F7-7DEF60C10B57}" type="datetimeFigureOut">
               <a:rPr lang="en-US" smtClean="0"/>
-              <a:t>10/7/19</a:t>
+              <a:t>10/9/19</a:t>
             </a:fld>
             <a:endParaRPr lang="en-US"/>
           </a:p>
@@ -1810,7 +1816,7 @@
           <a:p>
             <a:fld id="{D94C65FD-A4CC-A342-84F7-7DEF60C10B57}" type="datetimeFigureOut">
               <a:rPr lang="en-US" smtClean="0"/>
-              <a:t>10/7/19</a:t>
+              <a:t>10/9/19</a:t>
             </a:fld>
             <a:endParaRPr lang="en-US"/>
           </a:p>
@@ -1951,7 +1957,7 @@
           <a:p>
             <a:fld id="{D94C65FD-A4CC-A342-84F7-7DEF60C10B57}" type="datetimeFigureOut">
               <a:rPr lang="en-US" smtClean="0"/>
-              <a:t>10/7/19</a:t>
+              <a:t>10/9/19</a:t>
             </a:fld>
             <a:endParaRPr lang="en-US"/>
           </a:p>
@@ -2064,7 +2070,7 @@
           <a:p>
             <a:fld id="{D94C65FD-A4CC-A342-84F7-7DEF60C10B57}" type="datetimeFigureOut">
               <a:rPr lang="en-US" smtClean="0"/>
-              <a:t>10/7/19</a:t>
+              <a:t>10/9/19</a:t>
             </a:fld>
             <a:endParaRPr lang="en-US"/>
           </a:p>
@@ -2375,7 +2381,7 @@
           <a:p>
             <a:fld id="{D94C65FD-A4CC-A342-84F7-7DEF60C10B57}" type="datetimeFigureOut">
               <a:rPr lang="en-US" smtClean="0"/>
-              <a:t>10/7/19</a:t>
+              <a:t>10/9/19</a:t>
             </a:fld>
             <a:endParaRPr lang="en-US"/>
           </a:p>
@@ -2663,7 +2669,7 @@
           <a:p>
             <a:fld id="{D94C65FD-A4CC-A342-84F7-7DEF60C10B57}" type="datetimeFigureOut">
               <a:rPr lang="en-US" smtClean="0"/>
-              <a:t>10/7/19</a:t>
+              <a:t>10/9/19</a:t>
             </a:fld>
             <a:endParaRPr lang="en-US"/>
           </a:p>
@@ -2904,7 +2910,7 @@
           <a:p>
             <a:fld id="{D94C65FD-A4CC-A342-84F7-7DEF60C10B57}" type="datetimeFigureOut">
               <a:rPr lang="en-US" smtClean="0"/>
-              <a:t>10/7/19</a:t>
+              <a:t>10/9/19</a:t>
             </a:fld>
             <a:endParaRPr lang="en-US"/>
           </a:p>
@@ -6792,6 +6798,2031 @@
 </p:sld>
 </file>
 
+<file path=ppt/slides/slide2.xml><?xml version="1.0" encoding="utf-8"?>
+<p:sld xmlns:a="http://schemas.openxmlformats.org/drawingml/2006/main" xmlns:r="http://schemas.openxmlformats.org/officeDocument/2006/relationships" xmlns:p="http://schemas.openxmlformats.org/presentationml/2006/main">
+  <p:cSld>
+    <p:spTree>
+      <p:nvGrpSpPr>
+        <p:cNvPr id="1" name=""/>
+        <p:cNvGrpSpPr/>
+        <p:nvPr/>
+      </p:nvGrpSpPr>
+      <p:grpSpPr>
+        <a:xfrm>
+          <a:off x="0" y="0"/>
+          <a:ext cx="0" cy="0"/>
+          <a:chOff x="0" y="0"/>
+          <a:chExt cx="0" cy="0"/>
+        </a:xfrm>
+      </p:grpSpPr>
+      <p:grpSp>
+        <p:nvGrpSpPr>
+          <p:cNvPr id="10" name="Group 9">
+            <a:extLst>
+              <a:ext uri="{FF2B5EF4-FFF2-40B4-BE49-F238E27FC236}">
+                <a16:creationId xmlns:a16="http://schemas.microsoft.com/office/drawing/2014/main" id="{3887E6CA-A9A0-DC4C-B587-994BC5612146}"/>
+              </a:ext>
+            </a:extLst>
+          </p:cNvPr>
+          <p:cNvGrpSpPr/>
+          <p:nvPr/>
+        </p:nvGrpSpPr>
+        <p:grpSpPr>
+          <a:xfrm>
+            <a:off x="4988416" y="1590006"/>
+            <a:ext cx="2008953" cy="671513"/>
+            <a:chOff x="3214688" y="1200150"/>
+            <a:chExt cx="2008953" cy="671513"/>
+          </a:xfrm>
+        </p:grpSpPr>
+        <p:sp>
+          <p:nvSpPr>
+            <p:cNvPr id="4" name="Rectangle 3">
+              <a:extLst>
+                <a:ext uri="{FF2B5EF4-FFF2-40B4-BE49-F238E27FC236}">
+                  <a16:creationId xmlns:a16="http://schemas.microsoft.com/office/drawing/2014/main" id="{1F32E19F-5A3A-7740-AE19-109323A389DB}"/>
+                </a:ext>
+              </a:extLst>
+            </p:cNvPr>
+            <p:cNvSpPr/>
+            <p:nvPr/>
+          </p:nvSpPr>
+          <p:spPr>
+            <a:xfrm>
+              <a:off x="3214688" y="1200150"/>
+              <a:ext cx="2008953" cy="671513"/>
+            </a:xfrm>
+            <a:prstGeom prst="rect">
+              <a:avLst/>
+            </a:prstGeom>
+            <a:noFill/>
+            <a:ln w="19050">
+              <a:solidFill>
+                <a:schemeClr val="accent1"/>
+              </a:solidFill>
+            </a:ln>
+          </p:spPr>
+          <p:style>
+            <a:lnRef idx="2">
+              <a:schemeClr val="accent1">
+                <a:shade val="50000"/>
+              </a:schemeClr>
+            </a:lnRef>
+            <a:fillRef idx="1">
+              <a:schemeClr val="accent1"/>
+            </a:fillRef>
+            <a:effectRef idx="0">
+              <a:schemeClr val="accent1"/>
+            </a:effectRef>
+            <a:fontRef idx="minor">
+              <a:schemeClr val="lt1"/>
+            </a:fontRef>
+          </p:style>
+          <p:txBody>
+            <a:bodyPr rtlCol="0" anchor="ctr"/>
+            <a:lstStyle/>
+            <a:p>
+              <a:pPr algn="ctr"/>
+              <a:endParaRPr lang="en-US"/>
+            </a:p>
+          </p:txBody>
+        </p:sp>
+        <p:sp>
+          <p:nvSpPr>
+            <p:cNvPr id="8" name="TextBox 7">
+              <a:extLst>
+                <a:ext uri="{FF2B5EF4-FFF2-40B4-BE49-F238E27FC236}">
+                  <a16:creationId xmlns:a16="http://schemas.microsoft.com/office/drawing/2014/main" id="{32EE4137-AB86-2344-A0ED-836C490D76BB}"/>
+                </a:ext>
+              </a:extLst>
+            </p:cNvPr>
+            <p:cNvSpPr txBox="1"/>
+            <p:nvPr/>
+          </p:nvSpPr>
+          <p:spPr>
+            <a:xfrm>
+              <a:off x="3300248" y="1351240"/>
+              <a:ext cx="1044581" cy="369332"/>
+            </a:xfrm>
+            <a:prstGeom prst="rect">
+              <a:avLst/>
+            </a:prstGeom>
+            <a:noFill/>
+          </p:spPr>
+          <p:txBody>
+            <a:bodyPr wrap="none" rtlCol="0">
+              <a:spAutoFit/>
+            </a:bodyPr>
+            <a:lstStyle/>
+            <a:p>
+              <a:r>
+                <a:rPr lang="en-US" dirty="0" err="1"/>
+                <a:t>time_key</a:t>
+              </a:r>
+              <a:endParaRPr lang="en-US" dirty="0"/>
+            </a:p>
+          </p:txBody>
+        </p:sp>
+      </p:grpSp>
+      <p:grpSp>
+        <p:nvGrpSpPr>
+          <p:cNvPr id="14" name="Group 13">
+            <a:extLst>
+              <a:ext uri="{FF2B5EF4-FFF2-40B4-BE49-F238E27FC236}">
+                <a16:creationId xmlns:a16="http://schemas.microsoft.com/office/drawing/2014/main" id="{CF00C73D-61C6-2B4E-8BBF-C1056690C97E}"/>
+              </a:ext>
+            </a:extLst>
+          </p:cNvPr>
+          <p:cNvGrpSpPr/>
+          <p:nvPr/>
+        </p:nvGrpSpPr>
+        <p:grpSpPr>
+          <a:xfrm>
+            <a:off x="4988416" y="2261518"/>
+            <a:ext cx="2008953" cy="671513"/>
+            <a:chOff x="3214688" y="1200150"/>
+            <a:chExt cx="2008953" cy="671513"/>
+          </a:xfrm>
+        </p:grpSpPr>
+        <p:sp>
+          <p:nvSpPr>
+            <p:cNvPr id="15" name="Rectangle 14">
+              <a:extLst>
+                <a:ext uri="{FF2B5EF4-FFF2-40B4-BE49-F238E27FC236}">
+                  <a16:creationId xmlns:a16="http://schemas.microsoft.com/office/drawing/2014/main" id="{79760B36-B462-BA44-8FDA-7BAEEF95C955}"/>
+                </a:ext>
+              </a:extLst>
+            </p:cNvPr>
+            <p:cNvSpPr/>
+            <p:nvPr/>
+          </p:nvSpPr>
+          <p:spPr>
+            <a:xfrm>
+              <a:off x="3214688" y="1200150"/>
+              <a:ext cx="2008953" cy="671513"/>
+            </a:xfrm>
+            <a:prstGeom prst="rect">
+              <a:avLst/>
+            </a:prstGeom>
+            <a:noFill/>
+            <a:ln w="19050">
+              <a:solidFill>
+                <a:schemeClr val="accent1"/>
+              </a:solidFill>
+            </a:ln>
+          </p:spPr>
+          <p:style>
+            <a:lnRef idx="2">
+              <a:schemeClr val="accent1">
+                <a:shade val="50000"/>
+              </a:schemeClr>
+            </a:lnRef>
+            <a:fillRef idx="1">
+              <a:schemeClr val="accent1"/>
+            </a:fillRef>
+            <a:effectRef idx="0">
+              <a:schemeClr val="accent1"/>
+            </a:effectRef>
+            <a:fontRef idx="minor">
+              <a:schemeClr val="lt1"/>
+            </a:fontRef>
+          </p:style>
+          <p:txBody>
+            <a:bodyPr rtlCol="0" anchor="ctr"/>
+            <a:lstStyle/>
+            <a:p>
+              <a:pPr algn="ctr"/>
+              <a:endParaRPr lang="en-US"/>
+            </a:p>
+          </p:txBody>
+        </p:sp>
+        <p:sp>
+          <p:nvSpPr>
+            <p:cNvPr id="16" name="TextBox 15">
+              <a:extLst>
+                <a:ext uri="{FF2B5EF4-FFF2-40B4-BE49-F238E27FC236}">
+                  <a16:creationId xmlns:a16="http://schemas.microsoft.com/office/drawing/2014/main" id="{222EB838-D690-D544-9BEB-62AB8EC30426}"/>
+                </a:ext>
+              </a:extLst>
+            </p:cNvPr>
+            <p:cNvSpPr txBox="1"/>
+            <p:nvPr/>
+          </p:nvSpPr>
+          <p:spPr>
+            <a:xfrm>
+              <a:off x="3300248" y="1351240"/>
+              <a:ext cx="1233094" cy="369332"/>
+            </a:xfrm>
+            <a:prstGeom prst="rect">
+              <a:avLst/>
+            </a:prstGeom>
+            <a:noFill/>
+          </p:spPr>
+          <p:txBody>
+            <a:bodyPr wrap="none" rtlCol="0">
+              <a:spAutoFit/>
+            </a:bodyPr>
+            <a:lstStyle/>
+            <a:p>
+              <a:r>
+                <a:rPr lang="en-US" dirty="0" err="1"/>
+                <a:t>doctor_key</a:t>
+              </a:r>
+              <a:endParaRPr lang="en-US" dirty="0"/>
+            </a:p>
+          </p:txBody>
+        </p:sp>
+      </p:grpSp>
+      <p:grpSp>
+        <p:nvGrpSpPr>
+          <p:cNvPr id="17" name="Group 16">
+            <a:extLst>
+              <a:ext uri="{FF2B5EF4-FFF2-40B4-BE49-F238E27FC236}">
+                <a16:creationId xmlns:a16="http://schemas.microsoft.com/office/drawing/2014/main" id="{C6989049-C837-3342-ADD9-D6B7AE7E7916}"/>
+              </a:ext>
+            </a:extLst>
+          </p:cNvPr>
+          <p:cNvGrpSpPr/>
+          <p:nvPr/>
+        </p:nvGrpSpPr>
+        <p:grpSpPr>
+          <a:xfrm>
+            <a:off x="4988416" y="2933029"/>
+            <a:ext cx="2008953" cy="671513"/>
+            <a:chOff x="3214688" y="1200150"/>
+            <a:chExt cx="2008953" cy="671513"/>
+          </a:xfrm>
+        </p:grpSpPr>
+        <p:sp>
+          <p:nvSpPr>
+            <p:cNvPr id="18" name="Rectangle 17">
+              <a:extLst>
+                <a:ext uri="{FF2B5EF4-FFF2-40B4-BE49-F238E27FC236}">
+                  <a16:creationId xmlns:a16="http://schemas.microsoft.com/office/drawing/2014/main" id="{FE1F46AC-AF40-AF4E-A5BE-8520845B2B29}"/>
+                </a:ext>
+              </a:extLst>
+            </p:cNvPr>
+            <p:cNvSpPr/>
+            <p:nvPr/>
+          </p:nvSpPr>
+          <p:spPr>
+            <a:xfrm>
+              <a:off x="3214688" y="1200150"/>
+              <a:ext cx="2008953" cy="671513"/>
+            </a:xfrm>
+            <a:prstGeom prst="rect">
+              <a:avLst/>
+            </a:prstGeom>
+            <a:noFill/>
+            <a:ln w="19050">
+              <a:solidFill>
+                <a:schemeClr val="accent1"/>
+              </a:solidFill>
+            </a:ln>
+          </p:spPr>
+          <p:style>
+            <a:lnRef idx="2">
+              <a:schemeClr val="accent1">
+                <a:shade val="50000"/>
+              </a:schemeClr>
+            </a:lnRef>
+            <a:fillRef idx="1">
+              <a:schemeClr val="accent1"/>
+            </a:fillRef>
+            <a:effectRef idx="0">
+              <a:schemeClr val="accent1"/>
+            </a:effectRef>
+            <a:fontRef idx="minor">
+              <a:schemeClr val="lt1"/>
+            </a:fontRef>
+          </p:style>
+          <p:txBody>
+            <a:bodyPr rtlCol="0" anchor="ctr"/>
+            <a:lstStyle/>
+            <a:p>
+              <a:pPr algn="ctr"/>
+              <a:endParaRPr lang="en-US"/>
+            </a:p>
+          </p:txBody>
+        </p:sp>
+        <p:sp>
+          <p:nvSpPr>
+            <p:cNvPr id="19" name="TextBox 18">
+              <a:extLst>
+                <a:ext uri="{FF2B5EF4-FFF2-40B4-BE49-F238E27FC236}">
+                  <a16:creationId xmlns:a16="http://schemas.microsoft.com/office/drawing/2014/main" id="{135FB741-50ED-4249-B01B-FC9B6A9FD62C}"/>
+                </a:ext>
+              </a:extLst>
+            </p:cNvPr>
+            <p:cNvSpPr txBox="1"/>
+            <p:nvPr/>
+          </p:nvSpPr>
+          <p:spPr>
+            <a:xfrm>
+              <a:off x="3300248" y="1351240"/>
+              <a:ext cx="1287212" cy="369332"/>
+            </a:xfrm>
+            <a:prstGeom prst="rect">
+              <a:avLst/>
+            </a:prstGeom>
+            <a:noFill/>
+          </p:spPr>
+          <p:txBody>
+            <a:bodyPr wrap="none" rtlCol="0">
+              <a:spAutoFit/>
+            </a:bodyPr>
+            <a:lstStyle/>
+            <a:p>
+              <a:r>
+                <a:rPr lang="en-US" dirty="0" err="1"/>
+                <a:t>patient_key</a:t>
+              </a:r>
+              <a:endParaRPr lang="en-US" dirty="0"/>
+            </a:p>
+          </p:txBody>
+        </p:sp>
+      </p:grpSp>
+      <p:sp>
+        <p:nvSpPr>
+          <p:cNvPr id="24" name="Rectangle 23">
+            <a:extLst>
+              <a:ext uri="{FF2B5EF4-FFF2-40B4-BE49-F238E27FC236}">
+                <a16:creationId xmlns:a16="http://schemas.microsoft.com/office/drawing/2014/main" id="{5B797C17-2081-3F42-B431-70ED9C4C879F}"/>
+              </a:ext>
+            </a:extLst>
+          </p:cNvPr>
+          <p:cNvSpPr/>
+          <p:nvPr/>
+        </p:nvSpPr>
+        <p:spPr>
+          <a:xfrm>
+            <a:off x="4988416" y="3609806"/>
+            <a:ext cx="2008953" cy="671513"/>
+          </a:xfrm>
+          <a:prstGeom prst="rect">
+            <a:avLst/>
+          </a:prstGeom>
+          <a:noFill/>
+          <a:ln w="19050">
+            <a:solidFill>
+              <a:schemeClr val="tx1"/>
+            </a:solidFill>
+          </a:ln>
+        </p:spPr>
+        <p:style>
+          <a:lnRef idx="2">
+            <a:schemeClr val="accent1">
+              <a:shade val="50000"/>
+            </a:schemeClr>
+          </a:lnRef>
+          <a:fillRef idx="1">
+            <a:schemeClr val="accent1"/>
+          </a:fillRef>
+          <a:effectRef idx="0">
+            <a:schemeClr val="accent1"/>
+          </a:effectRef>
+          <a:fontRef idx="minor">
+            <a:schemeClr val="lt1"/>
+          </a:fontRef>
+        </p:style>
+        <p:txBody>
+          <a:bodyPr rtlCol="0" anchor="ctr"/>
+          <a:lstStyle/>
+          <a:p>
+            <a:pPr algn="ctr"/>
+            <a:endParaRPr lang="en-US"/>
+          </a:p>
+        </p:txBody>
+      </p:sp>
+      <p:sp>
+        <p:nvSpPr>
+          <p:cNvPr id="27" name="Rectangle 26">
+            <a:extLst>
+              <a:ext uri="{FF2B5EF4-FFF2-40B4-BE49-F238E27FC236}">
+                <a16:creationId xmlns:a16="http://schemas.microsoft.com/office/drawing/2014/main" id="{DC5AB27E-BF79-8B43-9308-3D4BEDB16B4D}"/>
+              </a:ext>
+            </a:extLst>
+          </p:cNvPr>
+          <p:cNvSpPr/>
+          <p:nvPr/>
+        </p:nvSpPr>
+        <p:spPr>
+          <a:xfrm>
+            <a:off x="4988416" y="4281318"/>
+            <a:ext cx="2008953" cy="671513"/>
+          </a:xfrm>
+          <a:prstGeom prst="rect">
+            <a:avLst/>
+          </a:prstGeom>
+          <a:noFill/>
+          <a:ln w="19050">
+            <a:solidFill>
+              <a:schemeClr val="tx1"/>
+            </a:solidFill>
+          </a:ln>
+        </p:spPr>
+        <p:style>
+          <a:lnRef idx="2">
+            <a:schemeClr val="accent1">
+              <a:shade val="50000"/>
+            </a:schemeClr>
+          </a:lnRef>
+          <a:fillRef idx="1">
+            <a:schemeClr val="accent1"/>
+          </a:fillRef>
+          <a:effectRef idx="0">
+            <a:schemeClr val="accent1"/>
+          </a:effectRef>
+          <a:fontRef idx="minor">
+            <a:schemeClr val="lt1"/>
+          </a:fontRef>
+        </p:style>
+        <p:txBody>
+          <a:bodyPr rtlCol="0" anchor="ctr"/>
+          <a:lstStyle/>
+          <a:p>
+            <a:pPr algn="ctr"/>
+            <a:endParaRPr lang="en-US"/>
+          </a:p>
+        </p:txBody>
+      </p:sp>
+      <p:sp>
+        <p:nvSpPr>
+          <p:cNvPr id="29" name="TextBox 28">
+            <a:extLst>
+              <a:ext uri="{FF2B5EF4-FFF2-40B4-BE49-F238E27FC236}">
+                <a16:creationId xmlns:a16="http://schemas.microsoft.com/office/drawing/2014/main" id="{E78336D9-86D1-1542-A431-9FF6D8F1748D}"/>
+              </a:ext>
+            </a:extLst>
+          </p:cNvPr>
+          <p:cNvSpPr txBox="1"/>
+          <p:nvPr/>
+        </p:nvSpPr>
+        <p:spPr>
+          <a:xfrm>
+            <a:off x="5073975" y="3740781"/>
+            <a:ext cx="1235851" cy="369332"/>
+          </a:xfrm>
+          <a:prstGeom prst="rect">
+            <a:avLst/>
+          </a:prstGeom>
+          <a:noFill/>
+          <a:ln>
+            <a:noFill/>
+          </a:ln>
+        </p:spPr>
+        <p:txBody>
+          <a:bodyPr wrap="square" rtlCol="0">
+            <a:spAutoFit/>
+          </a:bodyPr>
+          <a:lstStyle/>
+          <a:p>
+            <a:r>
+              <a:rPr lang="en-US" dirty="0"/>
+              <a:t>count</a:t>
+            </a:r>
+          </a:p>
+        </p:txBody>
+      </p:sp>
+      <p:sp>
+        <p:nvSpPr>
+          <p:cNvPr id="30" name="TextBox 29">
+            <a:extLst>
+              <a:ext uri="{FF2B5EF4-FFF2-40B4-BE49-F238E27FC236}">
+                <a16:creationId xmlns:a16="http://schemas.microsoft.com/office/drawing/2014/main" id="{056D4DC3-4809-0B47-AE83-50207A8ED446}"/>
+              </a:ext>
+            </a:extLst>
+          </p:cNvPr>
+          <p:cNvSpPr txBox="1"/>
+          <p:nvPr/>
+        </p:nvSpPr>
+        <p:spPr>
+          <a:xfrm>
+            <a:off x="5073975" y="4398834"/>
+            <a:ext cx="1334853" cy="369332"/>
+          </a:xfrm>
+          <a:prstGeom prst="rect">
+            <a:avLst/>
+          </a:prstGeom>
+          <a:noFill/>
+          <a:ln>
+            <a:noFill/>
+          </a:ln>
+        </p:spPr>
+        <p:txBody>
+          <a:bodyPr wrap="square" rtlCol="0">
+            <a:spAutoFit/>
+          </a:bodyPr>
+          <a:lstStyle/>
+          <a:p>
+            <a:r>
+              <a:rPr lang="en-US" dirty="0"/>
+              <a:t>charge</a:t>
+            </a:r>
+          </a:p>
+        </p:txBody>
+      </p:sp>
+      <p:grpSp>
+        <p:nvGrpSpPr>
+          <p:cNvPr id="32" name="Group 31">
+            <a:extLst>
+              <a:ext uri="{FF2B5EF4-FFF2-40B4-BE49-F238E27FC236}">
+                <a16:creationId xmlns:a16="http://schemas.microsoft.com/office/drawing/2014/main" id="{EDEF09F9-5DC5-4843-BEA9-921266200B0A}"/>
+              </a:ext>
+            </a:extLst>
+          </p:cNvPr>
+          <p:cNvGrpSpPr/>
+          <p:nvPr/>
+        </p:nvGrpSpPr>
+        <p:grpSpPr>
+          <a:xfrm>
+            <a:off x="1597280" y="4514840"/>
+            <a:ext cx="2008953" cy="797421"/>
+            <a:chOff x="3214688" y="1200150"/>
+            <a:chExt cx="2008953" cy="797421"/>
+          </a:xfrm>
+        </p:grpSpPr>
+        <p:sp>
+          <p:nvSpPr>
+            <p:cNvPr id="33" name="Rectangle 32">
+              <a:extLst>
+                <a:ext uri="{FF2B5EF4-FFF2-40B4-BE49-F238E27FC236}">
+                  <a16:creationId xmlns:a16="http://schemas.microsoft.com/office/drawing/2014/main" id="{62CD7462-CE78-A443-A3F7-5EB707573479}"/>
+                </a:ext>
+              </a:extLst>
+            </p:cNvPr>
+            <p:cNvSpPr/>
+            <p:nvPr/>
+          </p:nvSpPr>
+          <p:spPr>
+            <a:xfrm>
+              <a:off x="3214688" y="1200150"/>
+              <a:ext cx="2008953" cy="671513"/>
+            </a:xfrm>
+            <a:prstGeom prst="rect">
+              <a:avLst/>
+            </a:prstGeom>
+            <a:noFill/>
+            <a:ln w="19050">
+              <a:solidFill>
+                <a:schemeClr val="accent1"/>
+              </a:solidFill>
+            </a:ln>
+          </p:spPr>
+          <p:style>
+            <a:lnRef idx="2">
+              <a:schemeClr val="accent1">
+                <a:shade val="50000"/>
+              </a:schemeClr>
+            </a:lnRef>
+            <a:fillRef idx="1">
+              <a:schemeClr val="accent1"/>
+            </a:fillRef>
+            <a:effectRef idx="0">
+              <a:schemeClr val="accent1"/>
+            </a:effectRef>
+            <a:fontRef idx="minor">
+              <a:schemeClr val="lt1"/>
+            </a:fontRef>
+          </p:style>
+          <p:txBody>
+            <a:bodyPr rtlCol="0" anchor="ctr"/>
+            <a:lstStyle/>
+            <a:p>
+              <a:pPr algn="ctr"/>
+              <a:endParaRPr lang="en-US"/>
+            </a:p>
+          </p:txBody>
+        </p:sp>
+        <p:sp>
+          <p:nvSpPr>
+            <p:cNvPr id="34" name="TextBox 33">
+              <a:extLst>
+                <a:ext uri="{FF2B5EF4-FFF2-40B4-BE49-F238E27FC236}">
+                  <a16:creationId xmlns:a16="http://schemas.microsoft.com/office/drawing/2014/main" id="{15F54DF9-C0D8-904D-BE52-B87345A7EA28}"/>
+                </a:ext>
+              </a:extLst>
+            </p:cNvPr>
+            <p:cNvSpPr txBox="1"/>
+            <p:nvPr/>
+          </p:nvSpPr>
+          <p:spPr>
+            <a:xfrm>
+              <a:off x="3300248" y="1351240"/>
+              <a:ext cx="1287212" cy="646331"/>
+            </a:xfrm>
+            <a:prstGeom prst="rect">
+              <a:avLst/>
+            </a:prstGeom>
+            <a:noFill/>
+          </p:spPr>
+          <p:txBody>
+            <a:bodyPr wrap="none" rtlCol="0">
+              <a:spAutoFit/>
+            </a:bodyPr>
+            <a:lstStyle/>
+            <a:p>
+              <a:r>
+                <a:rPr lang="en-US" dirty="0" err="1"/>
+                <a:t>patient_key</a:t>
+              </a:r>
+              <a:endParaRPr lang="en-US" dirty="0"/>
+            </a:p>
+            <a:p>
+              <a:endParaRPr lang="en-US" dirty="0"/>
+            </a:p>
+          </p:txBody>
+        </p:sp>
+      </p:grpSp>
+      <p:grpSp>
+        <p:nvGrpSpPr>
+          <p:cNvPr id="35" name="Group 34">
+            <a:extLst>
+              <a:ext uri="{FF2B5EF4-FFF2-40B4-BE49-F238E27FC236}">
+                <a16:creationId xmlns:a16="http://schemas.microsoft.com/office/drawing/2014/main" id="{15E02AD6-0FFF-8646-B903-4ED46E5090C9}"/>
+              </a:ext>
+            </a:extLst>
+          </p:cNvPr>
+          <p:cNvGrpSpPr/>
+          <p:nvPr/>
+        </p:nvGrpSpPr>
+        <p:grpSpPr>
+          <a:xfrm>
+            <a:off x="1597280" y="5186352"/>
+            <a:ext cx="2008953" cy="671513"/>
+            <a:chOff x="3214688" y="1200150"/>
+            <a:chExt cx="2008953" cy="671513"/>
+          </a:xfrm>
+        </p:grpSpPr>
+        <p:sp>
+          <p:nvSpPr>
+            <p:cNvPr id="36" name="Rectangle 35">
+              <a:extLst>
+                <a:ext uri="{FF2B5EF4-FFF2-40B4-BE49-F238E27FC236}">
+                  <a16:creationId xmlns:a16="http://schemas.microsoft.com/office/drawing/2014/main" id="{9BF38116-A3BA-2E41-A2FD-CD066A6035F3}"/>
+                </a:ext>
+              </a:extLst>
+            </p:cNvPr>
+            <p:cNvSpPr/>
+            <p:nvPr/>
+          </p:nvSpPr>
+          <p:spPr>
+            <a:xfrm>
+              <a:off x="3214688" y="1200150"/>
+              <a:ext cx="2008953" cy="671513"/>
+            </a:xfrm>
+            <a:prstGeom prst="rect">
+              <a:avLst/>
+            </a:prstGeom>
+            <a:noFill/>
+            <a:ln w="19050">
+              <a:solidFill>
+                <a:schemeClr val="accent1"/>
+              </a:solidFill>
+            </a:ln>
+          </p:spPr>
+          <p:style>
+            <a:lnRef idx="2">
+              <a:schemeClr val="accent1">
+                <a:shade val="50000"/>
+              </a:schemeClr>
+            </a:lnRef>
+            <a:fillRef idx="1">
+              <a:schemeClr val="accent1"/>
+            </a:fillRef>
+            <a:effectRef idx="0">
+              <a:schemeClr val="accent1"/>
+            </a:effectRef>
+            <a:fontRef idx="minor">
+              <a:schemeClr val="lt1"/>
+            </a:fontRef>
+          </p:style>
+          <p:txBody>
+            <a:bodyPr rtlCol="0" anchor="ctr"/>
+            <a:lstStyle/>
+            <a:p>
+              <a:pPr algn="ctr"/>
+              <a:endParaRPr lang="en-US"/>
+            </a:p>
+          </p:txBody>
+        </p:sp>
+        <p:sp>
+          <p:nvSpPr>
+            <p:cNvPr id="37" name="TextBox 36">
+              <a:extLst>
+                <a:ext uri="{FF2B5EF4-FFF2-40B4-BE49-F238E27FC236}">
+                  <a16:creationId xmlns:a16="http://schemas.microsoft.com/office/drawing/2014/main" id="{F13679A6-1E25-7E4B-B9D1-FB3937E2F820}"/>
+                </a:ext>
+              </a:extLst>
+            </p:cNvPr>
+            <p:cNvSpPr txBox="1"/>
+            <p:nvPr/>
+          </p:nvSpPr>
+          <p:spPr>
+            <a:xfrm>
+              <a:off x="3300248" y="1351240"/>
+              <a:ext cx="716863" cy="369332"/>
+            </a:xfrm>
+            <a:prstGeom prst="rect">
+              <a:avLst/>
+            </a:prstGeom>
+            <a:noFill/>
+          </p:spPr>
+          <p:txBody>
+            <a:bodyPr wrap="none" rtlCol="0">
+              <a:spAutoFit/>
+            </a:bodyPr>
+            <a:lstStyle/>
+            <a:p>
+              <a:r>
+                <a:rPr lang="en-US" dirty="0"/>
+                <a:t>name</a:t>
+              </a:r>
+            </a:p>
+          </p:txBody>
+        </p:sp>
+      </p:grpSp>
+      <p:grpSp>
+        <p:nvGrpSpPr>
+          <p:cNvPr id="38" name="Group 37">
+            <a:extLst>
+              <a:ext uri="{FF2B5EF4-FFF2-40B4-BE49-F238E27FC236}">
+                <a16:creationId xmlns:a16="http://schemas.microsoft.com/office/drawing/2014/main" id="{2F08C13E-5B45-FB42-B568-23DEA62627FC}"/>
+              </a:ext>
+            </a:extLst>
+          </p:cNvPr>
+          <p:cNvGrpSpPr/>
+          <p:nvPr/>
+        </p:nvGrpSpPr>
+        <p:grpSpPr>
+          <a:xfrm>
+            <a:off x="1597280" y="5857863"/>
+            <a:ext cx="2008953" cy="671513"/>
+            <a:chOff x="3214688" y="1200150"/>
+            <a:chExt cx="2008953" cy="671513"/>
+          </a:xfrm>
+        </p:grpSpPr>
+        <p:sp>
+          <p:nvSpPr>
+            <p:cNvPr id="39" name="Rectangle 38">
+              <a:extLst>
+                <a:ext uri="{FF2B5EF4-FFF2-40B4-BE49-F238E27FC236}">
+                  <a16:creationId xmlns:a16="http://schemas.microsoft.com/office/drawing/2014/main" id="{B6CA5111-6951-B545-8220-DC612B516ADE}"/>
+                </a:ext>
+              </a:extLst>
+            </p:cNvPr>
+            <p:cNvSpPr/>
+            <p:nvPr/>
+          </p:nvSpPr>
+          <p:spPr>
+            <a:xfrm>
+              <a:off x="3214688" y="1200150"/>
+              <a:ext cx="2008953" cy="671513"/>
+            </a:xfrm>
+            <a:prstGeom prst="rect">
+              <a:avLst/>
+            </a:prstGeom>
+            <a:noFill/>
+            <a:ln w="19050">
+              <a:solidFill>
+                <a:schemeClr val="accent1"/>
+              </a:solidFill>
+            </a:ln>
+          </p:spPr>
+          <p:style>
+            <a:lnRef idx="2">
+              <a:schemeClr val="accent1">
+                <a:shade val="50000"/>
+              </a:schemeClr>
+            </a:lnRef>
+            <a:fillRef idx="1">
+              <a:schemeClr val="accent1"/>
+            </a:fillRef>
+            <a:effectRef idx="0">
+              <a:schemeClr val="accent1"/>
+            </a:effectRef>
+            <a:fontRef idx="minor">
+              <a:schemeClr val="lt1"/>
+            </a:fontRef>
+          </p:style>
+          <p:txBody>
+            <a:bodyPr rtlCol="0" anchor="ctr"/>
+            <a:lstStyle/>
+            <a:p>
+              <a:pPr algn="ctr"/>
+              <a:endParaRPr lang="en-US"/>
+            </a:p>
+          </p:txBody>
+        </p:sp>
+        <p:sp>
+          <p:nvSpPr>
+            <p:cNvPr id="40" name="TextBox 39">
+              <a:extLst>
+                <a:ext uri="{FF2B5EF4-FFF2-40B4-BE49-F238E27FC236}">
+                  <a16:creationId xmlns:a16="http://schemas.microsoft.com/office/drawing/2014/main" id="{3EEA4B8C-3AE1-0344-A06B-14B5ED057FE6}"/>
+                </a:ext>
+              </a:extLst>
+            </p:cNvPr>
+            <p:cNvSpPr txBox="1"/>
+            <p:nvPr/>
+          </p:nvSpPr>
+          <p:spPr>
+            <a:xfrm>
+              <a:off x="3300248" y="1351240"/>
+              <a:ext cx="1481688" cy="369332"/>
+            </a:xfrm>
+            <a:prstGeom prst="rect">
+              <a:avLst/>
+            </a:prstGeom>
+            <a:noFill/>
+          </p:spPr>
+          <p:txBody>
+            <a:bodyPr wrap="none" rtlCol="0">
+              <a:spAutoFit/>
+            </a:bodyPr>
+            <a:lstStyle/>
+            <a:p>
+              <a:r>
+                <a:rPr lang="en-US" dirty="0" err="1"/>
+                <a:t>date_of_birth</a:t>
+              </a:r>
+              <a:endParaRPr lang="en-US" dirty="0"/>
+            </a:p>
+          </p:txBody>
+        </p:sp>
+      </p:grpSp>
+      <p:grpSp>
+        <p:nvGrpSpPr>
+          <p:cNvPr id="44" name="Group 43">
+            <a:extLst>
+              <a:ext uri="{FF2B5EF4-FFF2-40B4-BE49-F238E27FC236}">
+                <a16:creationId xmlns:a16="http://schemas.microsoft.com/office/drawing/2014/main" id="{E59F795D-3B19-9246-AC0E-F43BF21B25DA}"/>
+              </a:ext>
+            </a:extLst>
+          </p:cNvPr>
+          <p:cNvGrpSpPr/>
+          <p:nvPr/>
+        </p:nvGrpSpPr>
+        <p:grpSpPr>
+          <a:xfrm>
+            <a:off x="1197385" y="659080"/>
+            <a:ext cx="2008953" cy="797421"/>
+            <a:chOff x="3214688" y="1200150"/>
+            <a:chExt cx="2008953" cy="797421"/>
+          </a:xfrm>
+        </p:grpSpPr>
+        <p:sp>
+          <p:nvSpPr>
+            <p:cNvPr id="45" name="Rectangle 44">
+              <a:extLst>
+                <a:ext uri="{FF2B5EF4-FFF2-40B4-BE49-F238E27FC236}">
+                  <a16:creationId xmlns:a16="http://schemas.microsoft.com/office/drawing/2014/main" id="{94FC6BDD-B9C1-AE45-828D-99498E379FBA}"/>
+                </a:ext>
+              </a:extLst>
+            </p:cNvPr>
+            <p:cNvSpPr/>
+            <p:nvPr/>
+          </p:nvSpPr>
+          <p:spPr>
+            <a:xfrm>
+              <a:off x="3214688" y="1200150"/>
+              <a:ext cx="2008953" cy="671513"/>
+            </a:xfrm>
+            <a:prstGeom prst="rect">
+              <a:avLst/>
+            </a:prstGeom>
+            <a:noFill/>
+            <a:ln w="19050">
+              <a:solidFill>
+                <a:schemeClr val="accent1"/>
+              </a:solidFill>
+            </a:ln>
+          </p:spPr>
+          <p:style>
+            <a:lnRef idx="2">
+              <a:schemeClr val="accent1">
+                <a:shade val="50000"/>
+              </a:schemeClr>
+            </a:lnRef>
+            <a:fillRef idx="1">
+              <a:schemeClr val="accent1"/>
+            </a:fillRef>
+            <a:effectRef idx="0">
+              <a:schemeClr val="accent1"/>
+            </a:effectRef>
+            <a:fontRef idx="minor">
+              <a:schemeClr val="lt1"/>
+            </a:fontRef>
+          </p:style>
+          <p:txBody>
+            <a:bodyPr rtlCol="0" anchor="ctr"/>
+            <a:lstStyle/>
+            <a:p>
+              <a:pPr algn="ctr"/>
+              <a:endParaRPr lang="en-US"/>
+            </a:p>
+          </p:txBody>
+        </p:sp>
+        <p:sp>
+          <p:nvSpPr>
+            <p:cNvPr id="46" name="TextBox 45">
+              <a:extLst>
+                <a:ext uri="{FF2B5EF4-FFF2-40B4-BE49-F238E27FC236}">
+                  <a16:creationId xmlns:a16="http://schemas.microsoft.com/office/drawing/2014/main" id="{D09E6D6C-17D3-724E-ADC6-10A8CEC7AC81}"/>
+                </a:ext>
+              </a:extLst>
+            </p:cNvPr>
+            <p:cNvSpPr txBox="1"/>
+            <p:nvPr/>
+          </p:nvSpPr>
+          <p:spPr>
+            <a:xfrm>
+              <a:off x="3300248" y="1351240"/>
+              <a:ext cx="1383624" cy="646331"/>
+            </a:xfrm>
+            <a:prstGeom prst="rect">
+              <a:avLst/>
+            </a:prstGeom>
+            <a:noFill/>
+          </p:spPr>
+          <p:txBody>
+            <a:bodyPr wrap="square" rtlCol="0">
+              <a:spAutoFit/>
+            </a:bodyPr>
+            <a:lstStyle/>
+            <a:p>
+              <a:r>
+                <a:rPr lang="en-US" dirty="0" err="1"/>
+                <a:t>time_key</a:t>
+              </a:r>
+              <a:endParaRPr lang="en-US" dirty="0"/>
+            </a:p>
+            <a:p>
+              <a:endParaRPr lang="en-US" dirty="0"/>
+            </a:p>
+          </p:txBody>
+        </p:sp>
+      </p:grpSp>
+      <p:grpSp>
+        <p:nvGrpSpPr>
+          <p:cNvPr id="47" name="Group 46">
+            <a:extLst>
+              <a:ext uri="{FF2B5EF4-FFF2-40B4-BE49-F238E27FC236}">
+                <a16:creationId xmlns:a16="http://schemas.microsoft.com/office/drawing/2014/main" id="{BADB9A02-C250-3242-A8BF-27FBDA050A7F}"/>
+              </a:ext>
+            </a:extLst>
+          </p:cNvPr>
+          <p:cNvGrpSpPr/>
+          <p:nvPr/>
+        </p:nvGrpSpPr>
+        <p:grpSpPr>
+          <a:xfrm>
+            <a:off x="1197385" y="1330592"/>
+            <a:ext cx="2008953" cy="671513"/>
+            <a:chOff x="3214688" y="1200150"/>
+            <a:chExt cx="2008953" cy="671513"/>
+          </a:xfrm>
+        </p:grpSpPr>
+        <p:sp>
+          <p:nvSpPr>
+            <p:cNvPr id="48" name="Rectangle 47">
+              <a:extLst>
+                <a:ext uri="{FF2B5EF4-FFF2-40B4-BE49-F238E27FC236}">
+                  <a16:creationId xmlns:a16="http://schemas.microsoft.com/office/drawing/2014/main" id="{637A4DB8-0BF9-F749-B7C8-A7ED1FF61D06}"/>
+                </a:ext>
+              </a:extLst>
+            </p:cNvPr>
+            <p:cNvSpPr/>
+            <p:nvPr/>
+          </p:nvSpPr>
+          <p:spPr>
+            <a:xfrm>
+              <a:off x="3214688" y="1200150"/>
+              <a:ext cx="2008953" cy="671513"/>
+            </a:xfrm>
+            <a:prstGeom prst="rect">
+              <a:avLst/>
+            </a:prstGeom>
+            <a:noFill/>
+            <a:ln w="19050">
+              <a:solidFill>
+                <a:schemeClr val="accent1"/>
+              </a:solidFill>
+            </a:ln>
+          </p:spPr>
+          <p:style>
+            <a:lnRef idx="2">
+              <a:schemeClr val="accent1">
+                <a:shade val="50000"/>
+              </a:schemeClr>
+            </a:lnRef>
+            <a:fillRef idx="1">
+              <a:schemeClr val="accent1"/>
+            </a:fillRef>
+            <a:effectRef idx="0">
+              <a:schemeClr val="accent1"/>
+            </a:effectRef>
+            <a:fontRef idx="minor">
+              <a:schemeClr val="lt1"/>
+            </a:fontRef>
+          </p:style>
+          <p:txBody>
+            <a:bodyPr rtlCol="0" anchor="ctr"/>
+            <a:lstStyle/>
+            <a:p>
+              <a:pPr algn="ctr"/>
+              <a:endParaRPr lang="en-US"/>
+            </a:p>
+          </p:txBody>
+        </p:sp>
+        <p:sp>
+          <p:nvSpPr>
+            <p:cNvPr id="49" name="TextBox 48">
+              <a:extLst>
+                <a:ext uri="{FF2B5EF4-FFF2-40B4-BE49-F238E27FC236}">
+                  <a16:creationId xmlns:a16="http://schemas.microsoft.com/office/drawing/2014/main" id="{B4E0FF0A-C1C4-214D-B7C9-C4D2FB3B93A2}"/>
+                </a:ext>
+              </a:extLst>
+            </p:cNvPr>
+            <p:cNvSpPr txBox="1"/>
+            <p:nvPr/>
+          </p:nvSpPr>
+          <p:spPr>
+            <a:xfrm>
+              <a:off x="3300248" y="1351240"/>
+              <a:ext cx="517001" cy="369332"/>
+            </a:xfrm>
+            <a:prstGeom prst="rect">
+              <a:avLst/>
+            </a:prstGeom>
+            <a:noFill/>
+          </p:spPr>
+          <p:txBody>
+            <a:bodyPr wrap="none" rtlCol="0">
+              <a:spAutoFit/>
+            </a:bodyPr>
+            <a:lstStyle/>
+            <a:p>
+              <a:r>
+                <a:rPr lang="en-US" dirty="0"/>
+                <a:t>day</a:t>
+              </a:r>
+            </a:p>
+          </p:txBody>
+        </p:sp>
+      </p:grpSp>
+      <p:grpSp>
+        <p:nvGrpSpPr>
+          <p:cNvPr id="50" name="Group 49">
+            <a:extLst>
+              <a:ext uri="{FF2B5EF4-FFF2-40B4-BE49-F238E27FC236}">
+                <a16:creationId xmlns:a16="http://schemas.microsoft.com/office/drawing/2014/main" id="{3348ECCE-BFFF-AF41-BD68-C85F23BD0142}"/>
+              </a:ext>
+            </a:extLst>
+          </p:cNvPr>
+          <p:cNvGrpSpPr/>
+          <p:nvPr/>
+        </p:nvGrpSpPr>
+        <p:grpSpPr>
+          <a:xfrm>
+            <a:off x="1197385" y="2002103"/>
+            <a:ext cx="2008953" cy="671513"/>
+            <a:chOff x="3214688" y="1200150"/>
+            <a:chExt cx="2008953" cy="671513"/>
+          </a:xfrm>
+        </p:grpSpPr>
+        <p:sp>
+          <p:nvSpPr>
+            <p:cNvPr id="51" name="Rectangle 50">
+              <a:extLst>
+                <a:ext uri="{FF2B5EF4-FFF2-40B4-BE49-F238E27FC236}">
+                  <a16:creationId xmlns:a16="http://schemas.microsoft.com/office/drawing/2014/main" id="{8C160C36-146C-3F4A-B413-4F69A74E236E}"/>
+                </a:ext>
+              </a:extLst>
+            </p:cNvPr>
+            <p:cNvSpPr/>
+            <p:nvPr/>
+          </p:nvSpPr>
+          <p:spPr>
+            <a:xfrm>
+              <a:off x="3214688" y="1200150"/>
+              <a:ext cx="2008953" cy="671513"/>
+            </a:xfrm>
+            <a:prstGeom prst="rect">
+              <a:avLst/>
+            </a:prstGeom>
+            <a:noFill/>
+            <a:ln w="19050">
+              <a:solidFill>
+                <a:schemeClr val="accent1"/>
+              </a:solidFill>
+            </a:ln>
+          </p:spPr>
+          <p:style>
+            <a:lnRef idx="2">
+              <a:schemeClr val="accent1">
+                <a:shade val="50000"/>
+              </a:schemeClr>
+            </a:lnRef>
+            <a:fillRef idx="1">
+              <a:schemeClr val="accent1"/>
+            </a:fillRef>
+            <a:effectRef idx="0">
+              <a:schemeClr val="accent1"/>
+            </a:effectRef>
+            <a:fontRef idx="minor">
+              <a:schemeClr val="lt1"/>
+            </a:fontRef>
+          </p:style>
+          <p:txBody>
+            <a:bodyPr rtlCol="0" anchor="ctr"/>
+            <a:lstStyle/>
+            <a:p>
+              <a:pPr algn="ctr"/>
+              <a:endParaRPr lang="en-US"/>
+            </a:p>
+          </p:txBody>
+        </p:sp>
+        <p:sp>
+          <p:nvSpPr>
+            <p:cNvPr id="52" name="TextBox 51">
+              <a:extLst>
+                <a:ext uri="{FF2B5EF4-FFF2-40B4-BE49-F238E27FC236}">
+                  <a16:creationId xmlns:a16="http://schemas.microsoft.com/office/drawing/2014/main" id="{10E13042-A6CF-DF46-86A6-D3D532C2D32A}"/>
+                </a:ext>
+              </a:extLst>
+            </p:cNvPr>
+            <p:cNvSpPr txBox="1"/>
+            <p:nvPr/>
+          </p:nvSpPr>
+          <p:spPr>
+            <a:xfrm>
+              <a:off x="3300248" y="1351240"/>
+              <a:ext cx="809324" cy="369332"/>
+            </a:xfrm>
+            <a:prstGeom prst="rect">
+              <a:avLst/>
+            </a:prstGeom>
+            <a:noFill/>
+          </p:spPr>
+          <p:txBody>
+            <a:bodyPr wrap="none" rtlCol="0">
+              <a:spAutoFit/>
+            </a:bodyPr>
+            <a:lstStyle/>
+            <a:p>
+              <a:r>
+                <a:rPr lang="en-US" dirty="0"/>
+                <a:t>month</a:t>
+              </a:r>
+            </a:p>
+          </p:txBody>
+        </p:sp>
+      </p:grpSp>
+      <p:grpSp>
+        <p:nvGrpSpPr>
+          <p:cNvPr id="53" name="Group 52">
+            <a:extLst>
+              <a:ext uri="{FF2B5EF4-FFF2-40B4-BE49-F238E27FC236}">
+                <a16:creationId xmlns:a16="http://schemas.microsoft.com/office/drawing/2014/main" id="{442E8C66-BC29-0A4E-A5AE-A883D67537DF}"/>
+              </a:ext>
+            </a:extLst>
+          </p:cNvPr>
+          <p:cNvGrpSpPr/>
+          <p:nvPr/>
+        </p:nvGrpSpPr>
+        <p:grpSpPr>
+          <a:xfrm>
+            <a:off x="1197385" y="2673615"/>
+            <a:ext cx="2008953" cy="797421"/>
+            <a:chOff x="3214688" y="1200150"/>
+            <a:chExt cx="2008953" cy="797421"/>
+          </a:xfrm>
+        </p:grpSpPr>
+        <p:sp>
+          <p:nvSpPr>
+            <p:cNvPr id="54" name="Rectangle 53">
+              <a:extLst>
+                <a:ext uri="{FF2B5EF4-FFF2-40B4-BE49-F238E27FC236}">
+                  <a16:creationId xmlns:a16="http://schemas.microsoft.com/office/drawing/2014/main" id="{1DC2BAF2-3D0E-EF45-B1E9-17623E63EDF1}"/>
+                </a:ext>
+              </a:extLst>
+            </p:cNvPr>
+            <p:cNvSpPr/>
+            <p:nvPr/>
+          </p:nvSpPr>
+          <p:spPr>
+            <a:xfrm>
+              <a:off x="3214688" y="1200150"/>
+              <a:ext cx="2008953" cy="671513"/>
+            </a:xfrm>
+            <a:prstGeom prst="rect">
+              <a:avLst/>
+            </a:prstGeom>
+            <a:noFill/>
+            <a:ln w="19050">
+              <a:solidFill>
+                <a:schemeClr val="accent1"/>
+              </a:solidFill>
+            </a:ln>
+          </p:spPr>
+          <p:style>
+            <a:lnRef idx="2">
+              <a:schemeClr val="accent1">
+                <a:shade val="50000"/>
+              </a:schemeClr>
+            </a:lnRef>
+            <a:fillRef idx="1">
+              <a:schemeClr val="accent1"/>
+            </a:fillRef>
+            <a:effectRef idx="0">
+              <a:schemeClr val="accent1"/>
+            </a:effectRef>
+            <a:fontRef idx="minor">
+              <a:schemeClr val="lt1"/>
+            </a:fontRef>
+          </p:style>
+          <p:txBody>
+            <a:bodyPr rtlCol="0" anchor="ctr"/>
+            <a:lstStyle/>
+            <a:p>
+              <a:pPr algn="ctr"/>
+              <a:endParaRPr lang="en-US"/>
+            </a:p>
+          </p:txBody>
+        </p:sp>
+        <p:sp>
+          <p:nvSpPr>
+            <p:cNvPr id="55" name="TextBox 54">
+              <a:extLst>
+                <a:ext uri="{FF2B5EF4-FFF2-40B4-BE49-F238E27FC236}">
+                  <a16:creationId xmlns:a16="http://schemas.microsoft.com/office/drawing/2014/main" id="{E9F40CC4-54CD-D046-8845-51459CC1111D}"/>
+                </a:ext>
+              </a:extLst>
+            </p:cNvPr>
+            <p:cNvSpPr txBox="1"/>
+            <p:nvPr/>
+          </p:nvSpPr>
+          <p:spPr>
+            <a:xfrm>
+              <a:off x="3300248" y="1351240"/>
+              <a:ext cx="592213" cy="646331"/>
+            </a:xfrm>
+            <a:prstGeom prst="rect">
+              <a:avLst/>
+            </a:prstGeom>
+            <a:noFill/>
+          </p:spPr>
+          <p:txBody>
+            <a:bodyPr wrap="none" rtlCol="0">
+              <a:spAutoFit/>
+            </a:bodyPr>
+            <a:lstStyle/>
+            <a:p>
+              <a:r>
+                <a:rPr lang="en-US" dirty="0"/>
+                <a:t>year</a:t>
+              </a:r>
+            </a:p>
+            <a:p>
+              <a:endParaRPr lang="en-US" dirty="0"/>
+            </a:p>
+          </p:txBody>
+        </p:sp>
+      </p:grpSp>
+      <p:grpSp>
+        <p:nvGrpSpPr>
+          <p:cNvPr id="68" name="Group 67">
+            <a:extLst>
+              <a:ext uri="{FF2B5EF4-FFF2-40B4-BE49-F238E27FC236}">
+                <a16:creationId xmlns:a16="http://schemas.microsoft.com/office/drawing/2014/main" id="{92BF20C0-BC90-6944-844D-0D16CB952EAF}"/>
+              </a:ext>
+            </a:extLst>
+          </p:cNvPr>
+          <p:cNvGrpSpPr/>
+          <p:nvPr/>
+        </p:nvGrpSpPr>
+        <p:grpSpPr>
+          <a:xfrm>
+            <a:off x="8753906" y="1925763"/>
+            <a:ext cx="2008953" cy="520423"/>
+            <a:chOff x="3214688" y="1200150"/>
+            <a:chExt cx="2008953" cy="671513"/>
+          </a:xfrm>
+        </p:grpSpPr>
+        <p:sp>
+          <p:nvSpPr>
+            <p:cNvPr id="69" name="Rectangle 68">
+              <a:extLst>
+                <a:ext uri="{FF2B5EF4-FFF2-40B4-BE49-F238E27FC236}">
+                  <a16:creationId xmlns:a16="http://schemas.microsoft.com/office/drawing/2014/main" id="{C1AB9B5E-9833-BA4B-A219-046DFEC35306}"/>
+                </a:ext>
+              </a:extLst>
+            </p:cNvPr>
+            <p:cNvSpPr/>
+            <p:nvPr/>
+          </p:nvSpPr>
+          <p:spPr>
+            <a:xfrm>
+              <a:off x="3214688" y="1200150"/>
+              <a:ext cx="2008953" cy="671513"/>
+            </a:xfrm>
+            <a:prstGeom prst="rect">
+              <a:avLst/>
+            </a:prstGeom>
+            <a:noFill/>
+            <a:ln w="19050">
+              <a:solidFill>
+                <a:schemeClr val="accent1"/>
+              </a:solidFill>
+            </a:ln>
+          </p:spPr>
+          <p:style>
+            <a:lnRef idx="2">
+              <a:schemeClr val="accent1">
+                <a:shade val="50000"/>
+              </a:schemeClr>
+            </a:lnRef>
+            <a:fillRef idx="1">
+              <a:schemeClr val="accent1"/>
+            </a:fillRef>
+            <a:effectRef idx="0">
+              <a:schemeClr val="accent1"/>
+            </a:effectRef>
+            <a:fontRef idx="minor">
+              <a:schemeClr val="lt1"/>
+            </a:fontRef>
+          </p:style>
+          <p:txBody>
+            <a:bodyPr rtlCol="0" anchor="ctr"/>
+            <a:lstStyle/>
+            <a:p>
+              <a:pPr algn="ctr"/>
+              <a:endParaRPr lang="en-US"/>
+            </a:p>
+          </p:txBody>
+        </p:sp>
+        <p:sp>
+          <p:nvSpPr>
+            <p:cNvPr id="70" name="TextBox 69">
+              <a:extLst>
+                <a:ext uri="{FF2B5EF4-FFF2-40B4-BE49-F238E27FC236}">
+                  <a16:creationId xmlns:a16="http://schemas.microsoft.com/office/drawing/2014/main" id="{3CE26AAC-7231-C243-9F3F-89357FF44480}"/>
+                </a:ext>
+              </a:extLst>
+            </p:cNvPr>
+            <p:cNvSpPr txBox="1"/>
+            <p:nvPr/>
+          </p:nvSpPr>
+          <p:spPr>
+            <a:xfrm>
+              <a:off x="3300248" y="1351240"/>
+              <a:ext cx="1233094" cy="476557"/>
+            </a:xfrm>
+            <a:prstGeom prst="rect">
+              <a:avLst/>
+            </a:prstGeom>
+            <a:noFill/>
+          </p:spPr>
+          <p:txBody>
+            <a:bodyPr wrap="none" rtlCol="0">
+              <a:spAutoFit/>
+            </a:bodyPr>
+            <a:lstStyle/>
+            <a:p>
+              <a:r>
+                <a:rPr lang="en-US" dirty="0" err="1"/>
+                <a:t>doctor_key</a:t>
+              </a:r>
+              <a:endParaRPr lang="en-US" dirty="0"/>
+            </a:p>
+          </p:txBody>
+        </p:sp>
+      </p:grpSp>
+      <p:grpSp>
+        <p:nvGrpSpPr>
+          <p:cNvPr id="71" name="Group 70">
+            <a:extLst>
+              <a:ext uri="{FF2B5EF4-FFF2-40B4-BE49-F238E27FC236}">
+                <a16:creationId xmlns:a16="http://schemas.microsoft.com/office/drawing/2014/main" id="{3739134F-1421-8A4E-8F35-B54CCED4874D}"/>
+              </a:ext>
+            </a:extLst>
+          </p:cNvPr>
+          <p:cNvGrpSpPr/>
+          <p:nvPr/>
+        </p:nvGrpSpPr>
+        <p:grpSpPr>
+          <a:xfrm>
+            <a:off x="8753906" y="2443787"/>
+            <a:ext cx="2008953" cy="590188"/>
+            <a:chOff x="3214688" y="1200150"/>
+            <a:chExt cx="2008953" cy="671513"/>
+          </a:xfrm>
+        </p:grpSpPr>
+        <p:sp>
+          <p:nvSpPr>
+            <p:cNvPr id="72" name="Rectangle 71">
+              <a:extLst>
+                <a:ext uri="{FF2B5EF4-FFF2-40B4-BE49-F238E27FC236}">
+                  <a16:creationId xmlns:a16="http://schemas.microsoft.com/office/drawing/2014/main" id="{E6051669-54CB-BD4D-BC38-B528EBAD7707}"/>
+                </a:ext>
+              </a:extLst>
+            </p:cNvPr>
+            <p:cNvSpPr/>
+            <p:nvPr/>
+          </p:nvSpPr>
+          <p:spPr>
+            <a:xfrm>
+              <a:off x="3214688" y="1200150"/>
+              <a:ext cx="2008953" cy="671513"/>
+            </a:xfrm>
+            <a:prstGeom prst="rect">
+              <a:avLst/>
+            </a:prstGeom>
+            <a:noFill/>
+            <a:ln w="19050">
+              <a:solidFill>
+                <a:schemeClr val="accent1"/>
+              </a:solidFill>
+            </a:ln>
+          </p:spPr>
+          <p:style>
+            <a:lnRef idx="2">
+              <a:schemeClr val="accent1">
+                <a:shade val="50000"/>
+              </a:schemeClr>
+            </a:lnRef>
+            <a:fillRef idx="1">
+              <a:schemeClr val="accent1"/>
+            </a:fillRef>
+            <a:effectRef idx="0">
+              <a:schemeClr val="accent1"/>
+            </a:effectRef>
+            <a:fontRef idx="minor">
+              <a:schemeClr val="lt1"/>
+            </a:fontRef>
+          </p:style>
+          <p:txBody>
+            <a:bodyPr rtlCol="0" anchor="ctr"/>
+            <a:lstStyle/>
+            <a:p>
+              <a:pPr algn="ctr"/>
+              <a:endParaRPr lang="en-US"/>
+            </a:p>
+          </p:txBody>
+        </p:sp>
+        <p:sp>
+          <p:nvSpPr>
+            <p:cNvPr id="73" name="TextBox 72">
+              <a:extLst>
+                <a:ext uri="{FF2B5EF4-FFF2-40B4-BE49-F238E27FC236}">
+                  <a16:creationId xmlns:a16="http://schemas.microsoft.com/office/drawing/2014/main" id="{4F542878-826D-FC4B-ACAE-307C59420128}"/>
+                </a:ext>
+              </a:extLst>
+            </p:cNvPr>
+            <p:cNvSpPr txBox="1"/>
+            <p:nvPr/>
+          </p:nvSpPr>
+          <p:spPr>
+            <a:xfrm>
+              <a:off x="3300248" y="1351240"/>
+              <a:ext cx="716863" cy="420224"/>
+            </a:xfrm>
+            <a:prstGeom prst="rect">
+              <a:avLst/>
+            </a:prstGeom>
+            <a:noFill/>
+          </p:spPr>
+          <p:txBody>
+            <a:bodyPr wrap="none" rtlCol="0">
+              <a:spAutoFit/>
+            </a:bodyPr>
+            <a:lstStyle/>
+            <a:p>
+              <a:r>
+                <a:rPr lang="en-US" dirty="0"/>
+                <a:t>name</a:t>
+              </a:r>
+            </a:p>
+          </p:txBody>
+        </p:sp>
+      </p:grpSp>
+      <p:grpSp>
+        <p:nvGrpSpPr>
+          <p:cNvPr id="74" name="Group 73">
+            <a:extLst>
+              <a:ext uri="{FF2B5EF4-FFF2-40B4-BE49-F238E27FC236}">
+                <a16:creationId xmlns:a16="http://schemas.microsoft.com/office/drawing/2014/main" id="{6171FAA4-8E3B-CF40-A3BA-BB69BDD692C0}"/>
+              </a:ext>
+            </a:extLst>
+          </p:cNvPr>
+          <p:cNvGrpSpPr/>
+          <p:nvPr/>
+        </p:nvGrpSpPr>
+        <p:grpSpPr>
+          <a:xfrm>
+            <a:off x="8753906" y="3052632"/>
+            <a:ext cx="2008953" cy="520423"/>
+            <a:chOff x="3214688" y="1200150"/>
+            <a:chExt cx="2008953" cy="671513"/>
+          </a:xfrm>
+        </p:grpSpPr>
+        <p:sp>
+          <p:nvSpPr>
+            <p:cNvPr id="75" name="Rectangle 74">
+              <a:extLst>
+                <a:ext uri="{FF2B5EF4-FFF2-40B4-BE49-F238E27FC236}">
+                  <a16:creationId xmlns:a16="http://schemas.microsoft.com/office/drawing/2014/main" id="{C73234B0-2B00-F945-991E-EDBAD464CA52}"/>
+                </a:ext>
+              </a:extLst>
+            </p:cNvPr>
+            <p:cNvSpPr/>
+            <p:nvPr/>
+          </p:nvSpPr>
+          <p:spPr>
+            <a:xfrm>
+              <a:off x="3214688" y="1200150"/>
+              <a:ext cx="2008953" cy="671513"/>
+            </a:xfrm>
+            <a:prstGeom prst="rect">
+              <a:avLst/>
+            </a:prstGeom>
+            <a:noFill/>
+            <a:ln w="19050">
+              <a:solidFill>
+                <a:schemeClr val="accent1"/>
+              </a:solidFill>
+            </a:ln>
+          </p:spPr>
+          <p:style>
+            <a:lnRef idx="2">
+              <a:schemeClr val="accent1">
+                <a:shade val="50000"/>
+              </a:schemeClr>
+            </a:lnRef>
+            <a:fillRef idx="1">
+              <a:schemeClr val="accent1"/>
+            </a:fillRef>
+            <a:effectRef idx="0">
+              <a:schemeClr val="accent1"/>
+            </a:effectRef>
+            <a:fontRef idx="minor">
+              <a:schemeClr val="lt1"/>
+            </a:fontRef>
+          </p:style>
+          <p:txBody>
+            <a:bodyPr rtlCol="0" anchor="ctr"/>
+            <a:lstStyle/>
+            <a:p>
+              <a:pPr algn="ctr"/>
+              <a:endParaRPr lang="en-US"/>
+            </a:p>
+          </p:txBody>
+        </p:sp>
+        <p:sp>
+          <p:nvSpPr>
+            <p:cNvPr id="76" name="TextBox 75">
+              <a:extLst>
+                <a:ext uri="{FF2B5EF4-FFF2-40B4-BE49-F238E27FC236}">
+                  <a16:creationId xmlns:a16="http://schemas.microsoft.com/office/drawing/2014/main" id="{9490FD7E-3A46-5444-8125-A93CA0BA8BE8}"/>
+                </a:ext>
+              </a:extLst>
+            </p:cNvPr>
+            <p:cNvSpPr txBox="1"/>
+            <p:nvPr/>
+          </p:nvSpPr>
+          <p:spPr>
+            <a:xfrm>
+              <a:off x="3300248" y="1351240"/>
+              <a:ext cx="1448282" cy="476557"/>
+            </a:xfrm>
+            <a:prstGeom prst="rect">
+              <a:avLst/>
+            </a:prstGeom>
+            <a:noFill/>
+          </p:spPr>
+          <p:txBody>
+            <a:bodyPr wrap="none" rtlCol="0">
+              <a:spAutoFit/>
+            </a:bodyPr>
+            <a:lstStyle/>
+            <a:p>
+              <a:r>
+                <a:rPr lang="en-US" dirty="0"/>
+                <a:t>specialization</a:t>
+              </a:r>
+            </a:p>
+          </p:txBody>
+        </p:sp>
+      </p:grpSp>
+      <p:grpSp>
+        <p:nvGrpSpPr>
+          <p:cNvPr id="77" name="Group 76">
+            <a:extLst>
+              <a:ext uri="{FF2B5EF4-FFF2-40B4-BE49-F238E27FC236}">
+                <a16:creationId xmlns:a16="http://schemas.microsoft.com/office/drawing/2014/main" id="{3385DCCB-C67E-8A4E-A29E-0595F65A34BD}"/>
+              </a:ext>
+            </a:extLst>
+          </p:cNvPr>
+          <p:cNvGrpSpPr/>
+          <p:nvPr/>
+        </p:nvGrpSpPr>
+        <p:grpSpPr>
+          <a:xfrm>
+            <a:off x="8753906" y="3581419"/>
+            <a:ext cx="2008953" cy="520424"/>
+            <a:chOff x="3214688" y="1200150"/>
+            <a:chExt cx="2008953" cy="671513"/>
+          </a:xfrm>
+        </p:grpSpPr>
+        <p:sp>
+          <p:nvSpPr>
+            <p:cNvPr id="78" name="Rectangle 77">
+              <a:extLst>
+                <a:ext uri="{FF2B5EF4-FFF2-40B4-BE49-F238E27FC236}">
+                  <a16:creationId xmlns:a16="http://schemas.microsoft.com/office/drawing/2014/main" id="{E36367CA-1541-4E40-AB4C-9DEB3EFB7344}"/>
+                </a:ext>
+              </a:extLst>
+            </p:cNvPr>
+            <p:cNvSpPr/>
+            <p:nvPr/>
+          </p:nvSpPr>
+          <p:spPr>
+            <a:xfrm>
+              <a:off x="3214688" y="1200150"/>
+              <a:ext cx="2008953" cy="671513"/>
+            </a:xfrm>
+            <a:prstGeom prst="rect">
+              <a:avLst/>
+            </a:prstGeom>
+            <a:noFill/>
+            <a:ln w="19050">
+              <a:solidFill>
+                <a:schemeClr val="accent1"/>
+              </a:solidFill>
+            </a:ln>
+          </p:spPr>
+          <p:style>
+            <a:lnRef idx="2">
+              <a:schemeClr val="accent1">
+                <a:shade val="50000"/>
+              </a:schemeClr>
+            </a:lnRef>
+            <a:fillRef idx="1">
+              <a:schemeClr val="accent1"/>
+            </a:fillRef>
+            <a:effectRef idx="0">
+              <a:schemeClr val="accent1"/>
+            </a:effectRef>
+            <a:fontRef idx="minor">
+              <a:schemeClr val="lt1"/>
+            </a:fontRef>
+          </p:style>
+          <p:txBody>
+            <a:bodyPr rtlCol="0" anchor="ctr"/>
+            <a:lstStyle/>
+            <a:p>
+              <a:pPr algn="ctr"/>
+              <a:endParaRPr lang="en-US"/>
+            </a:p>
+          </p:txBody>
+        </p:sp>
+        <p:sp>
+          <p:nvSpPr>
+            <p:cNvPr id="79" name="TextBox 78">
+              <a:extLst>
+                <a:ext uri="{FF2B5EF4-FFF2-40B4-BE49-F238E27FC236}">
+                  <a16:creationId xmlns:a16="http://schemas.microsoft.com/office/drawing/2014/main" id="{DB4F4F07-3C73-3644-A011-8C620F381009}"/>
+                </a:ext>
+              </a:extLst>
+            </p:cNvPr>
+            <p:cNvSpPr txBox="1"/>
+            <p:nvPr/>
+          </p:nvSpPr>
+          <p:spPr>
+            <a:xfrm>
+              <a:off x="3300248" y="1351240"/>
+              <a:ext cx="1076705" cy="476556"/>
+            </a:xfrm>
+            <a:prstGeom prst="rect">
+              <a:avLst/>
+            </a:prstGeom>
+            <a:noFill/>
+          </p:spPr>
+          <p:txBody>
+            <a:bodyPr wrap="none" rtlCol="0">
+              <a:spAutoFit/>
+            </a:bodyPr>
+            <a:lstStyle/>
+            <a:p>
+              <a:r>
+                <a:rPr lang="en-US" dirty="0"/>
+                <a:t>employer</a:t>
+              </a:r>
+            </a:p>
+          </p:txBody>
+        </p:sp>
+      </p:grpSp>
+      <p:cxnSp>
+        <p:nvCxnSpPr>
+          <p:cNvPr id="106" name="Straight Connector 105">
+            <a:extLst>
+              <a:ext uri="{FF2B5EF4-FFF2-40B4-BE49-F238E27FC236}">
+                <a16:creationId xmlns:a16="http://schemas.microsoft.com/office/drawing/2014/main" id="{797374BA-8272-2A4C-8C09-F9A1AE2779C3}"/>
+              </a:ext>
+            </a:extLst>
+          </p:cNvPr>
+          <p:cNvCxnSpPr>
+            <a:cxnSpLocks/>
+            <a:stCxn id="45" idx="3"/>
+            <a:endCxn id="4" idx="1"/>
+          </p:cNvCxnSpPr>
+          <p:nvPr/>
+        </p:nvCxnSpPr>
+        <p:spPr>
+          <a:xfrm>
+            <a:off x="3206338" y="994837"/>
+            <a:ext cx="1782078" cy="930926"/>
+          </a:xfrm>
+          <a:prstGeom prst="line">
+            <a:avLst/>
+          </a:prstGeom>
+          <a:ln w="41275"/>
+        </p:spPr>
+        <p:style>
+          <a:lnRef idx="1">
+            <a:schemeClr val="dk1"/>
+          </a:lnRef>
+          <a:fillRef idx="0">
+            <a:schemeClr val="dk1"/>
+          </a:fillRef>
+          <a:effectRef idx="0">
+            <a:schemeClr val="dk1"/>
+          </a:effectRef>
+          <a:fontRef idx="minor">
+            <a:schemeClr val="tx1"/>
+          </a:fontRef>
+        </p:style>
+      </p:cxnSp>
+      <p:cxnSp>
+        <p:nvCxnSpPr>
+          <p:cNvPr id="109" name="Straight Connector 108">
+            <a:extLst>
+              <a:ext uri="{FF2B5EF4-FFF2-40B4-BE49-F238E27FC236}">
+                <a16:creationId xmlns:a16="http://schemas.microsoft.com/office/drawing/2014/main" id="{0D4C5EC9-813C-CC4B-9948-AE291BF72501}"/>
+              </a:ext>
+            </a:extLst>
+          </p:cNvPr>
+          <p:cNvCxnSpPr>
+            <a:cxnSpLocks/>
+            <a:stCxn id="33" idx="3"/>
+            <a:endCxn id="18" idx="1"/>
+          </p:cNvCxnSpPr>
+          <p:nvPr/>
+        </p:nvCxnSpPr>
+        <p:spPr>
+          <a:xfrm flipV="1">
+            <a:off x="3606233" y="3268786"/>
+            <a:ext cx="1382183" cy="1581811"/>
+          </a:xfrm>
+          <a:prstGeom prst="line">
+            <a:avLst/>
+          </a:prstGeom>
+          <a:ln w="41275"/>
+        </p:spPr>
+        <p:style>
+          <a:lnRef idx="1">
+            <a:schemeClr val="dk1"/>
+          </a:lnRef>
+          <a:fillRef idx="0">
+            <a:schemeClr val="dk1"/>
+          </a:fillRef>
+          <a:effectRef idx="0">
+            <a:schemeClr val="dk1"/>
+          </a:effectRef>
+          <a:fontRef idx="minor">
+            <a:schemeClr val="tx1"/>
+          </a:fontRef>
+        </p:style>
+      </p:cxnSp>
+      <p:cxnSp>
+        <p:nvCxnSpPr>
+          <p:cNvPr id="112" name="Straight Connector 111">
+            <a:extLst>
+              <a:ext uri="{FF2B5EF4-FFF2-40B4-BE49-F238E27FC236}">
+                <a16:creationId xmlns:a16="http://schemas.microsoft.com/office/drawing/2014/main" id="{D75B2F7F-63DA-3148-B56F-BD18CF10D607}"/>
+              </a:ext>
+            </a:extLst>
+          </p:cNvPr>
+          <p:cNvCxnSpPr>
+            <a:cxnSpLocks/>
+            <a:stCxn id="15" idx="3"/>
+            <a:endCxn id="70" idx="1"/>
+          </p:cNvCxnSpPr>
+          <p:nvPr/>
+        </p:nvCxnSpPr>
+        <p:spPr>
+          <a:xfrm flipV="1">
+            <a:off x="6997369" y="2227524"/>
+            <a:ext cx="1842097" cy="369751"/>
+          </a:xfrm>
+          <a:prstGeom prst="line">
+            <a:avLst/>
+          </a:prstGeom>
+          <a:ln w="41275"/>
+        </p:spPr>
+        <p:style>
+          <a:lnRef idx="1">
+            <a:schemeClr val="dk1"/>
+          </a:lnRef>
+          <a:fillRef idx="0">
+            <a:schemeClr val="dk1"/>
+          </a:fillRef>
+          <a:effectRef idx="0">
+            <a:schemeClr val="dk1"/>
+          </a:effectRef>
+          <a:fontRef idx="minor">
+            <a:schemeClr val="tx1"/>
+          </a:fontRef>
+        </p:style>
+      </p:cxnSp>
+      <p:sp>
+        <p:nvSpPr>
+          <p:cNvPr id="133" name="TextBox 132">
+            <a:extLst>
+              <a:ext uri="{FF2B5EF4-FFF2-40B4-BE49-F238E27FC236}">
+                <a16:creationId xmlns:a16="http://schemas.microsoft.com/office/drawing/2014/main" id="{F89A5318-D69E-4845-B099-A81392F2CB2E}"/>
+              </a:ext>
+            </a:extLst>
+          </p:cNvPr>
+          <p:cNvSpPr txBox="1"/>
+          <p:nvPr/>
+        </p:nvSpPr>
+        <p:spPr>
+          <a:xfrm>
+            <a:off x="1245605" y="60886"/>
+            <a:ext cx="1923393" cy="646331"/>
+          </a:xfrm>
+          <a:prstGeom prst="rect">
+            <a:avLst/>
+          </a:prstGeom>
+          <a:noFill/>
+        </p:spPr>
+        <p:txBody>
+          <a:bodyPr wrap="square" rtlCol="0">
+            <a:spAutoFit/>
+          </a:bodyPr>
+          <a:lstStyle/>
+          <a:p>
+            <a:r>
+              <a:rPr lang="en-US" b="1" dirty="0"/>
+              <a:t>time</a:t>
+            </a:r>
+          </a:p>
+          <a:p>
+            <a:r>
+              <a:rPr lang="en-US" dirty="0"/>
+              <a:t>Dimension table</a:t>
+            </a:r>
+          </a:p>
+        </p:txBody>
+      </p:sp>
+      <p:sp>
+        <p:nvSpPr>
+          <p:cNvPr id="134" name="TextBox 133">
+            <a:extLst>
+              <a:ext uri="{FF2B5EF4-FFF2-40B4-BE49-F238E27FC236}">
+                <a16:creationId xmlns:a16="http://schemas.microsoft.com/office/drawing/2014/main" id="{F28CEE27-49C0-8048-B9AA-61473F7358F6}"/>
+              </a:ext>
+            </a:extLst>
+          </p:cNvPr>
+          <p:cNvSpPr txBox="1"/>
+          <p:nvPr/>
+        </p:nvSpPr>
+        <p:spPr>
+          <a:xfrm>
+            <a:off x="1590531" y="3862753"/>
+            <a:ext cx="1923393" cy="646331"/>
+          </a:xfrm>
+          <a:prstGeom prst="rect">
+            <a:avLst/>
+          </a:prstGeom>
+          <a:noFill/>
+        </p:spPr>
+        <p:txBody>
+          <a:bodyPr wrap="square" rtlCol="0">
+            <a:spAutoFit/>
+          </a:bodyPr>
+          <a:lstStyle/>
+          <a:p>
+            <a:r>
+              <a:rPr lang="en-US" b="1" dirty="0"/>
+              <a:t>patient</a:t>
+            </a:r>
+          </a:p>
+          <a:p>
+            <a:r>
+              <a:rPr lang="en-US" dirty="0"/>
+              <a:t>Dimension table</a:t>
+            </a:r>
+          </a:p>
+        </p:txBody>
+      </p:sp>
+      <p:sp>
+        <p:nvSpPr>
+          <p:cNvPr id="135" name="TextBox 134">
+            <a:extLst>
+              <a:ext uri="{FF2B5EF4-FFF2-40B4-BE49-F238E27FC236}">
+                <a16:creationId xmlns:a16="http://schemas.microsoft.com/office/drawing/2014/main" id="{8FE83FB1-6858-F341-A9F0-5ACDC2B236E7}"/>
+              </a:ext>
+            </a:extLst>
+          </p:cNvPr>
+          <p:cNvSpPr txBox="1"/>
+          <p:nvPr/>
+        </p:nvSpPr>
+        <p:spPr>
+          <a:xfrm>
+            <a:off x="4948858" y="797808"/>
+            <a:ext cx="2441646" cy="646331"/>
+          </a:xfrm>
+          <a:prstGeom prst="rect">
+            <a:avLst/>
+          </a:prstGeom>
+          <a:noFill/>
+        </p:spPr>
+        <p:txBody>
+          <a:bodyPr wrap="square" rtlCol="0">
+            <a:spAutoFit/>
+          </a:bodyPr>
+          <a:lstStyle/>
+          <a:p>
+            <a:r>
+              <a:rPr lang="en-US" b="1" dirty="0"/>
+              <a:t>doctor patient visits</a:t>
+            </a:r>
+          </a:p>
+          <a:p>
+            <a:r>
+              <a:rPr lang="en-US" dirty="0"/>
+              <a:t>Fact table</a:t>
+            </a:r>
+          </a:p>
+        </p:txBody>
+      </p:sp>
+      <p:sp>
+        <p:nvSpPr>
+          <p:cNvPr id="136" name="TextBox 135">
+            <a:extLst>
+              <a:ext uri="{FF2B5EF4-FFF2-40B4-BE49-F238E27FC236}">
+                <a16:creationId xmlns:a16="http://schemas.microsoft.com/office/drawing/2014/main" id="{D1B3216F-A72F-CF4E-895E-6E1443E3B80E}"/>
+              </a:ext>
+            </a:extLst>
+          </p:cNvPr>
+          <p:cNvSpPr txBox="1"/>
+          <p:nvPr/>
+        </p:nvSpPr>
+        <p:spPr>
+          <a:xfrm>
+            <a:off x="8779447" y="1207873"/>
+            <a:ext cx="1923393" cy="646331"/>
+          </a:xfrm>
+          <a:prstGeom prst="rect">
+            <a:avLst/>
+          </a:prstGeom>
+          <a:noFill/>
+        </p:spPr>
+        <p:txBody>
+          <a:bodyPr wrap="square" rtlCol="0">
+            <a:spAutoFit/>
+          </a:bodyPr>
+          <a:lstStyle/>
+          <a:p>
+            <a:r>
+              <a:rPr lang="en-US" b="1" dirty="0"/>
+              <a:t>course</a:t>
+            </a:r>
+          </a:p>
+          <a:p>
+            <a:r>
+              <a:rPr lang="en-US" dirty="0"/>
+              <a:t>Dimension table</a:t>
+            </a:r>
+          </a:p>
+        </p:txBody>
+      </p:sp>
+    </p:spTree>
+    <p:extLst>
+      <p:ext uri="{BB962C8B-B14F-4D97-AF65-F5344CB8AC3E}">
+        <p14:creationId xmlns:p14="http://schemas.microsoft.com/office/powerpoint/2010/main" val="3854084750"/>
+      </p:ext>
+    </p:extLst>
+  </p:cSld>
+  <p:clrMapOvr>
+    <a:masterClrMapping/>
+  </p:clrMapOvr>
+</p:sld>
+</file>
+
 <file path=ppt/theme/theme1.xml><?xml version="1.0" encoding="utf-8"?>
 <a:theme xmlns:a="http://schemas.openxmlformats.org/drawingml/2006/main" name="Office Theme">
   <a:themeElements>

</xml_diff>